<commit_message>
Add README file for Mastering Playwright course
</commit_message>
<xml_diff>
--- a/Mastering Playwright - Presentation.pptx
+++ b/Mastering Playwright - Presentation.pptx
@@ -6727,7 +6727,7 @@
         </p:nvSpPr>
         <p:spPr>
           <a:xfrm>
-            <a:off x="4930733" y="2766218"/>
+            <a:off x="4970062" y="4142734"/>
             <a:ext cx="6926969" cy="1325563"/>
           </a:xfrm>
         </p:spPr>
@@ -6781,6 +6781,36 @@
           </a:p>
         </p:txBody>
       </p:sp>
+      <p:pic>
+        <p:nvPicPr>
+          <p:cNvPr id="3" name="Picture 2">
+            <a:extLst>
+              <a:ext uri="{FF2B5EF4-FFF2-40B4-BE49-F238E27FC236}">
+                <a16:creationId xmlns:a16="http://schemas.microsoft.com/office/drawing/2014/main" id="{AF341455-046E-8893-DA9D-D398192499BA}"/>
+              </a:ext>
+            </a:extLst>
+          </p:cNvPr>
+          <p:cNvPicPr>
+            <a:picLocks noChangeAspect="1"/>
+          </p:cNvPicPr>
+          <p:nvPr/>
+        </p:nvPicPr>
+        <p:blipFill>
+          <a:blip r:embed="rId4"/>
+          <a:stretch>
+            <a:fillRect/>
+          </a:stretch>
+        </p:blipFill>
+        <p:spPr>
+          <a:xfrm>
+            <a:off x="4970062" y="973392"/>
+            <a:ext cx="3991897" cy="2993923"/>
+          </a:xfrm>
+          <a:prstGeom prst="rect">
+            <a:avLst/>
+          </a:prstGeom>
+        </p:spPr>
+      </p:pic>
     </p:spTree>
     <p:extLst>
       <p:ext uri="{BB962C8B-B14F-4D97-AF65-F5344CB8AC3E}">
@@ -7008,62 +7038,148 @@
             <p:ph type="body" sz="quarter" idx="11"/>
           </p:nvPr>
         </p:nvSpPr>
-        <p:spPr/>
+        <p:spPr>
+          <a:xfrm>
+            <a:off x="762001" y="1904999"/>
+            <a:ext cx="6327058" cy="4237039"/>
+          </a:xfrm>
+        </p:spPr>
         <p:txBody>
           <a:bodyPr/>
           <a:lstStyle/>
           <a:p>
+            <a:pPr lvl="1"/>
+            <a:r>
+              <a:rPr lang="en-US" dirty="0"/>
+              <a:t>Playwright is a modern test automation framework for reliable end-to-end testing of web applications. </a:t>
+            </a:r>
+          </a:p>
+          <a:p>
+            <a:pPr lvl="1"/>
+            <a:r>
+              <a:rPr lang="en-US" dirty="0"/>
+              <a:t>It supports </a:t>
+            </a:r>
+            <a:r>
+              <a:rPr lang="en-US" b="1" dirty="0"/>
+              <a:t>Chromium</a:t>
+            </a:r>
+            <a:r>
+              <a:rPr lang="en-US" dirty="0"/>
+              <a:t>, </a:t>
+            </a:r>
+            <a:r>
+              <a:rPr lang="en-US" b="1" dirty="0"/>
+              <a:t>Firefox</a:t>
+            </a:r>
+            <a:r>
+              <a:rPr lang="en-US" dirty="0"/>
+              <a:t>, and </a:t>
+            </a:r>
+            <a:r>
+              <a:rPr lang="en-US" b="1" dirty="0"/>
+              <a:t>WebKit</a:t>
+            </a:r>
+            <a:r>
+              <a:rPr lang="en-US" dirty="0"/>
+              <a:t>, works across multiple languages (</a:t>
+            </a:r>
+            <a:r>
+              <a:rPr lang="en-US" b="1" dirty="0"/>
+              <a:t>TypeScript</a:t>
+            </a:r>
+            <a:r>
+              <a:rPr lang="en-US" dirty="0"/>
+              <a:t>, </a:t>
+            </a:r>
+            <a:r>
+              <a:rPr lang="en-US" b="1" dirty="0"/>
+              <a:t>JavaScript</a:t>
+            </a:r>
+            <a:r>
+              <a:rPr lang="en-US" dirty="0"/>
+              <a:t>, </a:t>
+            </a:r>
+            <a:r>
+              <a:rPr lang="en-US" b="1" dirty="0"/>
+              <a:t>Python</a:t>
+            </a:r>
+            <a:r>
+              <a:rPr lang="en-US" dirty="0"/>
+              <a:t>, </a:t>
+            </a:r>
+            <a:r>
+              <a:rPr lang="en-US" b="1" dirty="0"/>
+              <a:t>Java</a:t>
+            </a:r>
+            <a:r>
+              <a:rPr lang="en-US" dirty="0"/>
+              <a:t>, </a:t>
+            </a:r>
+            <a:r>
+              <a:rPr lang="en-US" b="1" dirty="0"/>
+              <a:t>C#</a:t>
+            </a:r>
+            <a:r>
+              <a:rPr lang="en-US" dirty="0"/>
+              <a:t>), </a:t>
+            </a:r>
+          </a:p>
+          <a:p>
+            <a:pPr lvl="1"/>
             <a:r>
               <a:rPr lang="en-US" altLang="en-US" dirty="0"/>
-              <a:t>State the significance of Jewish American Heritage Month</a:t>
+              <a:t>With </a:t>
+            </a:r>
+            <a:r>
+              <a:rPr lang="en-US" altLang="en-US" b="1" dirty="0"/>
+              <a:t>auto-waiting</a:t>
+            </a:r>
+            <a:r>
+              <a:rPr lang="en-US" altLang="en-US" dirty="0"/>
+              <a:t>, </a:t>
+            </a:r>
+            <a:r>
+              <a:rPr lang="en-US" altLang="en-US" b="1" dirty="0"/>
+              <a:t>smart in built assertions</a:t>
+            </a:r>
+            <a:r>
+              <a:rPr lang="en-US" altLang="en-US" dirty="0"/>
+              <a:t>, </a:t>
+            </a:r>
+            <a:r>
+              <a:rPr lang="en-US" altLang="en-US" b="1" dirty="0"/>
+              <a:t>parallel execution</a:t>
+            </a:r>
+            <a:r>
+              <a:rPr lang="en-US" altLang="en-US" dirty="0"/>
+              <a:t>, and </a:t>
+            </a:r>
+            <a:r>
+              <a:rPr lang="en-US" altLang="en-US" b="1" dirty="0"/>
+              <a:t>network interception.</a:t>
             </a:r>
           </a:p>
           <a:p>
             <a:pPr lvl="1"/>
             <a:r>
+              <a:rPr lang="en-US" altLang="en-US" dirty="0"/>
+              <a:t>Playwright ensures fast, stable, and scalable test automation</a:t>
+            </a:r>
+          </a:p>
+          <a:p>
+            <a:pPr lvl="1"/>
+            <a:r>
               <a:rPr lang="en-US" dirty="0"/>
-              <a:t>What is </a:t>
-            </a:r>
-            <a:r>
-              <a:rPr lang="en-US" altLang="en-US" dirty="0"/>
-              <a:t>Jewish American Heritage </a:t>
-            </a:r>
+              <a:t>Supports running test cases in both headless and headed modes.</a:t>
+            </a:r>
+          </a:p>
+          <a:p>
+            <a:pPr lvl="1"/>
             <a:r>
               <a:rPr lang="en-US" dirty="0"/>
-              <a:t>Month?</a:t>
-            </a:r>
-          </a:p>
-          <a:p>
-            <a:pPr lvl="1"/>
-            <a:r>
-              <a:rPr lang="en-US" altLang="en-US" dirty="0"/>
-              <a:t>Why does the United States celebrate it?</a:t>
-            </a:r>
-          </a:p>
-          <a:p>
-            <a:pPr lvl="1"/>
-            <a:endParaRPr lang="en-US" altLang="en-US" dirty="0"/>
-          </a:p>
-          <a:p>
-            <a:r>
-              <a:rPr lang="en-US" altLang="en-US" dirty="0"/>
-              <a:t>Tell your story</a:t>
-            </a:r>
-          </a:p>
-          <a:p>
-            <a:pPr lvl="1"/>
-            <a:r>
-              <a:rPr lang="en-US" altLang="en-US" dirty="0"/>
-              <a:t>What does Jewish American Heritage Month mean to you?</a:t>
-            </a:r>
-          </a:p>
-          <a:p>
-            <a:pPr lvl="1"/>
-            <a:r>
-              <a:rPr lang="en-US" altLang="en-US" dirty="0"/>
-              <a:t>Why is it important to you?</a:t>
-            </a:r>
-            <a:endParaRPr lang="en-US" dirty="0"/>
+              <a:t>Supports All Major CI/CD Platforms – Works with GitHub Actions, GitLab CI, Jenkins, Azure DevOps, and more</a:t>
+            </a:r>
           </a:p>
         </p:txBody>
       </p:sp>

</xml_diff>